<commit_message>
uploading lab2 embedded systems explaination
</commit_message>
<xml_diff>
--- a/ThirdYear/SecondTerm/Embedded_Systems/labs/lab2/ES Lab 2 - Interrupts.pptx
+++ b/ThirdYear/SecondTerm/Embedded_Systems/labs/lab2/ES Lab 2 - Interrupts.pptx
@@ -216,6 +216,99 @@
   </p:cSld>
   <p:clrMap bg1="lt1" tx1="dk1" bg2="lt2" tx2="dk2" accent1="accent1" accent2="accent2" accent3="accent3" accent4="accent4" accent5="accent5" accent6="accent6" hlink="hlink" folHlink="folHlink"/>
 </p:handoutMaster>
+</file>
+
+<file path=ppt/ink/ink1.xml><?xml version="1.0" encoding="utf-8"?>
+<inkml:ink xmlns:inkml="http://www.w3.org/2003/InkML">
+  <inkml:definitions>
+    <inkml:context xml:id="ctx0">
+      <inkml:inkSource xml:id="inkSrc0">
+        <inkml:traceFormat>
+          <inkml:channel name="X" type="integer" max="3200" units="cm"/>
+          <inkml:channel name="Y" type="integer" max="1080" units="cm"/>
+          <inkml:channel name="T" type="integer" max="2.14748E9" units="dev"/>
+        </inkml:traceFormat>
+        <inkml:channelProperties>
+          <inkml:channelProperty channel="X" name="resolution" value="93.02325" units="1/cm"/>
+          <inkml:channelProperty channel="Y" name="resolution" value="55.6701" units="1/cm"/>
+          <inkml:channelProperty channel="T" name="resolution" value="1" units="1/dev"/>
+        </inkml:channelProperties>
+      </inkml:inkSource>
+      <inkml:timestamp xml:id="ts0" timeString="2023-02-26T20:13:20.179"/>
+    </inkml:context>
+    <inkml:brush xml:id="br0">
+      <inkml:brushProperty name="width" value="0.05292" units="cm"/>
+      <inkml:brushProperty name="height" value="0.05292" units="cm"/>
+      <inkml:brushProperty name="color" value="#FF0000"/>
+    </inkml:brush>
+  </inkml:definitions>
+  <inkml:trace contextRef="#ctx0" brushRef="#br0">12204 9863 0,'99'-20'156,"199"-20"-141,138 0-15,-98 21 16,-120-1-16,-20 0 16,41 0-16,-81 20 15,-39 0-15,-19-20 0,-41 20 16,40-20-16,-19 1 16,78-1-16,1 0 15,278-40 1,-338 60-16,0 0 15,0 0-15,20 0 16,20 20-16,-59-20 16,98 20-1,-98-20-15,-41 0 16,21 0-16,39 20 16,-39-20-16,59 0 15,99 0 1,-158 0-1,-1 0-15,-19 0 0,19 0 16,-39 0-16,40-20 16,-21 20-16,41-20 15,-1 0-15,-19 20 0,-1 0 16,21 0-16,-41 0 16,41 0-16,-21 0 15,1 0-15,-40 0 0,-1 0 16,1 0-16,79 0 31,-39 0-31,0 0 16,-1 0-16,1 0 0,-1 0 15,1 20-15,-1-20 16,-39 0-16,20 0 16,-1 0-16,-19 0 15,40 0-15,-21 0 0,1 0 16,0 0-16,19 20 15,1-20-15,-1 0 16,1 0-16,19 0 16,140 0-1,-180 0-15,41 0 16,-41 0-16,1 20 16,0-20-16,-1 0 0,-19 0 15,20 0-15,-20 0 16,0 0 15,-1 0 0,1 0-15,-20 20 31,0 0 0,0-1 0,0 1-32,0 0 1,0 0-16,0 59 31,0-59-31,0 20 16,0-1-1,0-19-15,0 20 16,0 20-16,0-1 16,40 159-1,-20-158-15,0-1 16,-20-39-16,0 0 15,0 40 1,20-41-16,-20 1 16,0 0 31,0 0-16,0 0 16,0 0-32,-20-20 126,-20 0-141,-39 0 0,-60 0 16,40 0-16,19 0 15,21 0-15,19 0 16,20 0-16,0 0 15,0 0-15,1 0 0,-1 0 16,0 0-16,0 0 16,0 0-16,-39 20 15,-1-20-15,-59 0 0,40 0 16,-21 0-16,21 0 16,20 0-16,-1 0 15,20 0-15,1 0 16,-1 0-16,20 19 15,0-19-15,-19 0 0,19 0 16,0 0-16,-20 0 16,1 0-16,39 20 15,-60-20-15,40 0 0,-20 0 16,1 0-16,-21 0 16,-19 20-16,39-20 15,-19 0-15,-1 0 16,-59 0-16,0 0 15,20 20-15,-20 0 0,39-20 16,21 0-16,-60 0 16,39 0-16,21 0 15,-21 0-15,-19 0 0,60 0 16,-1 0-16,-20 0 16,21 0-16,-1 0 15,-39 0-15,-60 0 16,-20 0-16,0 0 0,-79 0 15,79 0-15,80 0 16,-20 0-16,39 0 16,-19 0-16,39 0 15,-39 0-15,19 0 0,1 0 16,-1 0-16,-39 0 16,20 0-16,-60 0 15,0-20-15,-60 20 16,80-20-16,-99 0 0,119 0 15,-20 1-15,39-1 16,41 20-16,-1 0 16,0 0-16,20 0 0,1 0 15,-1 0-15,-20-20 16,20 20-16,-20-20 16,1 20-16,-41 0 15,21-20-15,-1-20 16,-79 21-1,100 19-15,-21-20 0,40 20 16,1-20-16,-1 20 16,-20 0-1,20 0-15,0 0 16,0 0-16,1 0 31,19-20-15,-20 20 15,20-20-15,-40 0-16,0 1 15,21 19-15,-21-20 16,20 0-16,0 20 16,0-20-16,-19 0 15,19 20-15,20-20 16,-20 1-16,20-1 15,-40 20 1,40-40-16,-20 20 16,1-79 15,-1 99-31,20-40 16,0 20-1,0-19 16,0 19 16</inkml:trace>
+  <inkml:trace contextRef="#ctx0" brushRef="#br0" timeOffset="1615">14030 9664 0,'0'20'187,"0"20"-171,0-1-16,0 1 0,0-20 16,0 20-16,19-1 15,-19 1-15,0-20 16,0 20 0,0-21-1,0 1 1,0 0-1,20 0 17,-20 0-32,20 0 31,-20-1-31,0 1 16,20-20-16,-20 20 15,0 0-15,20 0 16,-20 0-1,0 0 1,20 19 15,-20-19-15,0 0 0,19 0-16,1-20 15,-20 20 16,0-1-31,0 1 16,20-20-16,-20 20 16,0 0-1,0 0 1,0 0 15,0-1-15,20 1-1,-20 0 1,0 0 0,0-60 31</inkml:trace>
+  <inkml:trace contextRef="#ctx0" brushRef="#br0" timeOffset="4580.82">13474 10200 0,'-139'79'187,"40"21"-187,59-41 0,0-39 16,21 0-16,-1-20 16,20 20-16,-20-20 31,20 19-15,-20-19 46,0 0 32,0 0-63,20 20-15,-19-20-1,-1 0 1,-60 0 15,60 20-31,-39 0 0,-1-20 16,21 0-16,-21 20 0,20-20 15,1 0-15,19 20 16,0-20-16,0 0 16,0 0-16,1 0 15,19 20-15,-20-20 16,0 0 0,0 0-1,0 0 16,20-20 63,0 0-78,0 0-16,0 0 15,0 0 1,0-19 15,0 19-31,0 40 63,0-1-32,0 1-15,0 0-16,0 0 15,0 0 1,0 0 0,0 0-1,0-1 16,0 1 1,20-20-1,0 0-15,-20-20-16,20 20 0,0 0 15,-1-19-15,1 19 16,0 0-1,0 0 17,0 0-32,0 0 31,-1 0 0</inkml:trace>
+  <inkml:trace contextRef="#ctx0" brushRef="#br0" timeOffset="7479.07">11033 11152 0,'199'-19'172,"-21"-1"-157,21-40-15,-100 40 16,-20 20-16,40-19 0,-79 19 16,0 0-16,-21-20 15,21 20-15,-20-20 16,0 20-1,20 0 17,-21 0-17,1 0 32,0 40-16,-20-1-31,0 1 0,0 0 16,20-1-16,0 21 16,0-1-16,-20-19 15,0 0-15,19-1 0,1 21 16,-20 0-16,20-21 16,-20 21-16,0-21 15,20 1-15,-20 20 16,20 19-1,-20-59-15,0 0 0,0 0 16,0-1 15,0 1 1,-20-20 30,0 0-31,0 0-31,-19 0 32,19 0-1,0 0-31,0 0 15,0 0 1,0 0-16,1 0 16,-21 0-16,0 0 0,-19 0 15,-1 0-15,-79 0 16,80 0-16,-41 0 16,21 0-16,-40 20 15,99-20-15,-39 0 16,19 0-16,-20 0 0,21 0 15,19 0 1,-20 0-16,-19 0 16,39 0-16,-20 0 15,20 0-15,-19 0 0,19 0 16,0 0 0,-20 0 15,20 0-16,1 0 1,-1-20 15,0 0-31,20 1 16,-20-1 0,0-80 15,20 61-31,-20 19 0,0-20 15,20 1-15,0-21 16,-19 40-16,19 0 16,-20-39-16,20 19 0,0-19 15,0 19-15,0 20 16,0-20-16,0 21 16,0-21-1,0 20 1,0 0 15,0 0 16</inkml:trace>
+  <inkml:trace contextRef="#ctx0" brushRef="#br0" timeOffset="8737.4">10815 11172 0,'20'0'297,"0"0"-282,-1 0 1,1 0-1,0 0 17,0 0-1,0 0 16,0 0-32</inkml:trace>
+</inkml:ink>
+</file>
+
+<file path=ppt/ink/ink2.xml><?xml version="1.0" encoding="utf-8"?>
+<inkml:ink xmlns:inkml="http://www.w3.org/2003/InkML">
+  <inkml:definitions>
+    <inkml:context xml:id="ctx0">
+      <inkml:inkSource xml:id="inkSrc0">
+        <inkml:traceFormat>
+          <inkml:channel name="X" type="integer" max="3200" units="cm"/>
+          <inkml:channel name="Y" type="integer" max="1080" units="cm"/>
+          <inkml:channel name="T" type="integer" max="2.14748E9" units="dev"/>
+        </inkml:traceFormat>
+        <inkml:channelProperties>
+          <inkml:channelProperty channel="X" name="resolution" value="93.02325" units="1/cm"/>
+          <inkml:channelProperty channel="Y" name="resolution" value="55.6701" units="1/cm"/>
+          <inkml:channelProperty channel="T" name="resolution" value="1" units="1/dev"/>
+        </inkml:channelProperties>
+      </inkml:inkSource>
+      <inkml:timestamp xml:id="ts0" timeString="2023-02-26T20:10:51.987"/>
+    </inkml:context>
+    <inkml:brush xml:id="br0">
+      <inkml:brushProperty name="width" value="0.05292" units="cm"/>
+      <inkml:brushProperty name="height" value="0.05292" units="cm"/>
+      <inkml:brushProperty name="color" value="#FF0000"/>
+    </inkml:brush>
+  </inkml:definitions>
+  <inkml:trace contextRef="#ctx0" brushRef="#br0">18852 3652 0,'-40'0'203,"-40"0"-187,61 0-16,-21 0 16,20 0-16,0 0 15,0 19-15,1-19 16,-21 20-16,0 0 16,-19 20-1,39-20-15,0-1 16,20 1-1,-40-20 1,40 20 0,-20 0-1,20 0-15,0 0 16,0 0 0,0-1-16,0 21 15,0 0-15,0-1 16,0 21-16,0-40 15,0 19-15,20 1 0,0 20 16,-20-1-16,60-19 16,-60-20-16,39 39 15,-19-39-15,20 20 16,-20-596-16,39 1191 16,-39-595-16,0-40 0,39 40 15,-19-1-15,-20-19 16,20 0-16,-1 0 15,-19 0-15,20-1 0,-20 1 16,0-20-16,59 20 16,-59 0-16,20-20 15,-1 20-15,21 0 16,-1 0-16,1-20 0,-20 0 16,-21 0-16,1 0 15,0 0-15,20 0 16,-20-20-1,-20 0-15,19-20 16,-19 0-16,0 1 16,0-1-16,0 0 15,0 1-15,0-1 16,0 0 0,0-19 15,0 39-16,0 0 1,0 0 0,0 0-1,0 1 17,0-1-17,0 0 1,-19 0-16,19-20 15,-40 21-15,40-1 0,-20-20 16,-20 0-16,40 1 16,-19-1-16,-1 20 15,-20-59 1,20 59-16,0 0 16,20 0-16,-39 0 15,39 1-15,-20 19 16,20-20-16,-20 0 0,0 20 15,-20-20-15,40 0 16,-19 20-16,-1-20 16,0 20-16,20-20 15,-60-19 1,40 19 0,20 0-1,-39 0 1,39 0-16,-20 20 15,20-19-15,-20 19 16</inkml:trace>
+  <inkml:trace contextRef="#ctx0" brushRef="#br0" timeOffset="1004.08">19447 4068 0,'40'0'188,"98"0"-188,-38 0 16,98 0-16,-99-20 0,-19 20 15,59 0-15,0 0 16,-40 0-16,0-19 15,20 19-15,0-20 16,-59 20-16,-1 0 16,1-20-16,-1 0 0,-19 20 15,0-20-15,-21 20 16,21 0 0,0 0-16,-20 0 15</inkml:trace>
+  <inkml:trace contextRef="#ctx0" brushRef="#br0" timeOffset="3091.31">21689 3711 0,'-59'-40'171,"19"40"-171,-39-19 16,19-1-16,20 20 16,1 0-1,19 0-15,0 0 16,0 0 0,0 0-1,0 0 16,20 20-15,-19-20 0,-1 0-1,20 19-15,-20 1 32,20 0-17,0 0 1,-20 0-1,20 19 1,0 1 0,0-20-1,0 20-15,20 19 16,-20 1-16,0-21 16,0 80-1,0-39-15,20-1 0,0 20 16,-1 1-16,1-21 15,0 20-15,0-59 16,0-20-16,-20 19 0,20-39 16,0 20-1,-1-20-15,1 0 16,0 20 0,20-20-16,-20 0 0,19 0 15,-19 0-15,40 0 16,-1 0-16,21 0 15,-1 0-15,40 0 16,40 0-16,138-20 0,-118 0 16,-40 1-16,-20 19 15,-20-20-15,-39 20 16,-21 0-16,-19-20 16,-20 0-16,20 20 15,0-20-15,-20 0 31,0-595-15,0 1191-16,0-596 16,0-20 15,0-19-15,40 19-16,-40-39 0,0 19 15,39 1-15,-39-1 16,20 0-16,-20 21 15,0-21-15,0 1 16,0-1-16,-20 40 0,20 1 16,-19-1-16,19 0 15,-40-20-15,20 20 16,0 20-16,-20-20 16,-19 1-16,-1-1 15,-19 0-15,0 20 16,-40 0-16,39 0 15,1 0-15,-1 0 0,21 0 16,39 0-16,-39 0 16,39 0-16,-20 0 15,20 0-15,0 0 16,-59 0 0,59-615-16,-20 1250 15,21-635-15,-1 0 16,-20 0-16,0 0 15,21 20-15,-1-20 0,-20 19 16,0-19 0,20 0-1,1 20-15,-1-20 16,0 0 0,0 0-1,0 0 1,0 0-1,1 0-15,-1 0 16,0 0-16,0 0 16,-20 0-16,20 0 15,1 0 1,-1 0-16,0 0 0,0 0 31,0 0-15</inkml:trace>
+  <inkml:trace contextRef="#ctx0" brushRef="#br0" timeOffset="15124.55">20102 3374 0,'20'39'203,"-1"1"-187,-19-20-16,20 20 15,20 19 1,-40-19-1,20-20 1,-20 0 0,0-1-1,0 1 1,0 0 31,0 0 0,-20-40 46,0 20-77,20-40 0,-20 21-1,20-1 1,-20 20 0,20-40-1,0 20-15,0 0 16,0 0-1,-19 20 1,-1-39 0,20 19-16,0 0 15,-20 0 1,20 0 0,0 1 15,0-1 0,0 0-15,0 0-1,0 0 32,0 40 141,0 0-173,0 0 1,0 0 15,0-1 16,0 1 0,0 0-31,0 0 62,20 0-16,-20 0-46,20-20-1,-20 19 17</inkml:trace>
+  <inkml:trace contextRef="#ctx0" brushRef="#br0" timeOffset="28936.33">19864 3810 0,'0'100'188,"-20"38"-173,-20 61 1,40-159-16,0-1 0,-20 1 16,20 0-16,0-21 15,0 21 17,0-20 77</inkml:trace>
+  <inkml:trace contextRef="#ctx0" brushRef="#br0" timeOffset="52477.43">11867 8355 0</inkml:trace>
+</inkml:ink>
+</file>
+
+<file path=ppt/ink/ink3.xml><?xml version="1.0" encoding="utf-8"?>
+<inkml:ink xmlns:inkml="http://www.w3.org/2003/InkML">
+  <inkml:definitions>
+    <inkml:context xml:id="ctx0">
+      <inkml:inkSource xml:id="inkSrc0">
+        <inkml:traceFormat>
+          <inkml:channel name="X" type="integer" max="3200" units="cm"/>
+          <inkml:channel name="Y" type="integer" max="1080" units="cm"/>
+          <inkml:channel name="T" type="integer" max="2.14748E9" units="dev"/>
+        </inkml:traceFormat>
+        <inkml:channelProperties>
+          <inkml:channelProperty channel="X" name="resolution" value="93.02325" units="1/cm"/>
+          <inkml:channelProperty channel="Y" name="resolution" value="55.6701" units="1/cm"/>
+          <inkml:channelProperty channel="T" name="resolution" value="1" units="1/dev"/>
+        </inkml:channelProperties>
+      </inkml:inkSource>
+      <inkml:timestamp xml:id="ts0" timeString="2023-02-26T20:12:49.850"/>
+    </inkml:context>
+    <inkml:brush xml:id="br0">
+      <inkml:brushProperty name="width" value="0.05292" units="cm"/>
+      <inkml:brushProperty name="height" value="0.05292" units="cm"/>
+      <inkml:brushProperty name="color" value="#FF0000"/>
+    </inkml:brush>
+  </inkml:definitions>
+  <inkml:trace contextRef="#ctx0" brushRef="#br0">16192 6787 0</inkml:trace>
+</inkml:ink>
 </file>
 
 <file path=ppt/notesMasters/notesMaster1.xml><?xml version="1.0" encoding="utf-8"?>
@@ -5019,6 +5112,57 @@
           </a:prstGeom>
         </p:spPr>
       </p:pic>
+      <mc:AlternateContent xmlns:mc="http://schemas.openxmlformats.org/markup-compatibility/2006">
+        <mc:Choice xmlns:p14="http://schemas.microsoft.com/office/powerpoint/2010/main" Requires="p14">
+          <p:contentPart p14:bwMode="auto" r:id="rId4">
+            <p14:nvContentPartPr>
+              <p14:cNvPr id="3" name="Ink 2">
+                <a:extLst>
+                  <a:ext uri="{FF2B5EF4-FFF2-40B4-BE49-F238E27FC236}">
+                    <a16:creationId xmlns:a16="http://schemas.microsoft.com/office/drawing/2014/main" id="{DBEDA439-809D-8C16-5DA5-FBB975BEB48A}"/>
+                  </a:ext>
+                </a:extLst>
+              </p14:cNvPr>
+              <p14:cNvContentPartPr/>
+              <p14:nvPr/>
+            </p14:nvContentPartPr>
+            <p14:xfrm>
+              <a:off x="5829120" y="2443320"/>
+              <a:ext cx="360" cy="360"/>
+            </p14:xfrm>
+          </p:contentPart>
+        </mc:Choice>
+        <mc:Fallback>
+          <p:pic>
+            <p:nvPicPr>
+              <p:cNvPr id="3" name="Ink 2">
+                <a:extLst>
+                  <a:ext uri="{FF2B5EF4-FFF2-40B4-BE49-F238E27FC236}">
+                    <a16:creationId xmlns:a16="http://schemas.microsoft.com/office/drawing/2014/main" id="{DBEDA439-809D-8C16-5DA5-FBB975BEB48A}"/>
+                  </a:ext>
+                </a:extLst>
+              </p:cNvPr>
+              <p:cNvPicPr/>
+              <p:nvPr/>
+            </p:nvPicPr>
+            <p:blipFill>
+              <a:blip r:embed="rId5"/>
+              <a:stretch>
+                <a:fillRect/>
+              </a:stretch>
+            </p:blipFill>
+            <p:spPr>
+              <a:xfrm>
+                <a:off x="5819760" y="2433960"/>
+                <a:ext cx="19080" cy="19080"/>
+              </a:xfrm>
+              <a:prstGeom prst="rect">
+                <a:avLst/>
+              </a:prstGeom>
+            </p:spPr>
+          </p:pic>
+        </mc:Fallback>
+      </mc:AlternateContent>
     </p:spTree>
     <p:extLst>
       <p:ext uri="{BB962C8B-B14F-4D97-AF65-F5344CB8AC3E}">
@@ -6489,6 +6633,57 @@
           </a:effectLst>
         </p:spPr>
       </p:pic>
+      <mc:AlternateContent xmlns:mc="http://schemas.openxmlformats.org/markup-compatibility/2006">
+        <mc:Choice xmlns:p14="http://schemas.microsoft.com/office/powerpoint/2010/main" Requires="p14">
+          <p:contentPart p14:bwMode="auto" r:id="rId5">
+            <p14:nvContentPartPr>
+              <p14:cNvPr id="5" name="Ink 4">
+                <a:extLst>
+                  <a:ext uri="{FF2B5EF4-FFF2-40B4-BE49-F238E27FC236}">
+                    <a16:creationId xmlns:a16="http://schemas.microsoft.com/office/drawing/2014/main" id="{3B706D4F-A1D8-DC27-3EF7-7C52FF409B4C}"/>
+                  </a:ext>
+                </a:extLst>
+              </p14:cNvPr>
+              <p14:cNvContentPartPr/>
+              <p14:nvPr/>
+            </p14:nvContentPartPr>
+            <p14:xfrm>
+              <a:off x="3850560" y="3429000"/>
+              <a:ext cx="3258000" cy="879120"/>
+            </p14:xfrm>
+          </p:contentPart>
+        </mc:Choice>
+        <mc:Fallback>
+          <p:pic>
+            <p:nvPicPr>
+              <p:cNvPr id="5" name="Ink 4">
+                <a:extLst>
+                  <a:ext uri="{FF2B5EF4-FFF2-40B4-BE49-F238E27FC236}">
+                    <a16:creationId xmlns:a16="http://schemas.microsoft.com/office/drawing/2014/main" id="{3B706D4F-A1D8-DC27-3EF7-7C52FF409B4C}"/>
+                  </a:ext>
+                </a:extLst>
+              </p:cNvPr>
+              <p:cNvPicPr/>
+              <p:nvPr/>
+            </p:nvPicPr>
+            <p:blipFill>
+              <a:blip r:embed="rId6"/>
+              <a:stretch>
+                <a:fillRect/>
+              </a:stretch>
+            </p:blipFill>
+            <p:spPr>
+              <a:xfrm>
+                <a:off x="3841200" y="3419640"/>
+                <a:ext cx="3276720" cy="897840"/>
+              </a:xfrm>
+              <a:prstGeom prst="rect">
+                <a:avLst/>
+              </a:prstGeom>
+            </p:spPr>
+          </p:pic>
+        </mc:Fallback>
+      </mc:AlternateContent>
     </p:spTree>
     <p:extLst>
       <p:ext uri="{BB962C8B-B14F-4D97-AF65-F5344CB8AC3E}">
@@ -6966,6 +7161,57 @@
           </a:prstGeom>
         </p:spPr>
       </p:pic>
+      <mc:AlternateContent xmlns:mc="http://schemas.openxmlformats.org/markup-compatibility/2006">
+        <mc:Choice xmlns:p14="http://schemas.microsoft.com/office/powerpoint/2010/main" Requires="p14">
+          <p:contentPart p14:bwMode="auto" r:id="rId5">
+            <p14:nvContentPartPr>
+              <p14:cNvPr id="3" name="Ink 2">
+                <a:extLst>
+                  <a:ext uri="{FF2B5EF4-FFF2-40B4-BE49-F238E27FC236}">
+                    <a16:creationId xmlns:a16="http://schemas.microsoft.com/office/drawing/2014/main" id="{18D6497B-FDAA-11D0-490A-23B22D1BECB0}"/>
+                  </a:ext>
+                </a:extLst>
+              </p14:cNvPr>
+              <p14:cNvContentPartPr/>
+              <p14:nvPr/>
+            </p14:nvContentPartPr>
+            <p14:xfrm>
+              <a:off x="4272120" y="1121760"/>
+              <a:ext cx="4086360" cy="1886400"/>
+            </p14:xfrm>
+          </p:contentPart>
+        </mc:Choice>
+        <mc:Fallback>
+          <p:pic>
+            <p:nvPicPr>
+              <p:cNvPr id="3" name="Ink 2">
+                <a:extLst>
+                  <a:ext uri="{FF2B5EF4-FFF2-40B4-BE49-F238E27FC236}">
+                    <a16:creationId xmlns:a16="http://schemas.microsoft.com/office/drawing/2014/main" id="{18D6497B-FDAA-11D0-490A-23B22D1BECB0}"/>
+                  </a:ext>
+                </a:extLst>
+              </p:cNvPr>
+              <p:cNvPicPr/>
+              <p:nvPr/>
+            </p:nvPicPr>
+            <p:blipFill>
+              <a:blip r:embed="rId6"/>
+              <a:stretch>
+                <a:fillRect/>
+              </a:stretch>
+            </p:blipFill>
+            <p:spPr>
+              <a:xfrm>
+                <a:off x="4262760" y="1112400"/>
+                <a:ext cx="4105080" cy="1905120"/>
+              </a:xfrm>
+              <a:prstGeom prst="rect">
+                <a:avLst/>
+              </a:prstGeom>
+            </p:spPr>
+          </p:pic>
+        </mc:Fallback>
+      </mc:AlternateContent>
     </p:spTree>
     <p:extLst>
       <p:ext uri="{BB962C8B-B14F-4D97-AF65-F5344CB8AC3E}">

</xml_diff>